<commit_message>
Fix architectual diagram to include 3rd AZ
</commit_message>
<xml_diff>
--- a/docs/images/neo4j_architecture_diagram.pptx
+++ b/docs/images/neo4j_architecture_diagram.pptx
@@ -63,10 +63,10 @@
         </a:solidFill>
         <a:effectLst/>
         <a:uFillTx/>
-        <a:latin typeface="+mj-lt"/>
-        <a:ea typeface="+mj-ea"/>
-        <a:cs typeface="+mj-cs"/>
-        <a:sym typeface="Helvetica"/>
+        <a:latin typeface="+mn-lt"/>
+        <a:ea typeface="+mn-ea"/>
+        <a:cs typeface="+mn-cs"/>
+        <a:sym typeface="Calibri"/>
       </a:defRPr>
     </a:lvl1pPr>
     <a:lvl2pPr marL="0" marR="0" indent="0" algn="l" defTabSz="914400" rtl="0" fontAlgn="auto" latinLnBrk="0" hangingPunct="0">
@@ -93,10 +93,10 @@
         </a:solidFill>
         <a:effectLst/>
         <a:uFillTx/>
-        <a:latin typeface="+mj-lt"/>
-        <a:ea typeface="+mj-ea"/>
-        <a:cs typeface="+mj-cs"/>
-        <a:sym typeface="Helvetica"/>
+        <a:latin typeface="+mn-lt"/>
+        <a:ea typeface="+mn-ea"/>
+        <a:cs typeface="+mn-cs"/>
+        <a:sym typeface="Calibri"/>
       </a:defRPr>
     </a:lvl2pPr>
     <a:lvl3pPr marL="0" marR="0" indent="0" algn="l" defTabSz="914400" rtl="0" fontAlgn="auto" latinLnBrk="0" hangingPunct="0">
@@ -123,10 +123,10 @@
         </a:solidFill>
         <a:effectLst/>
         <a:uFillTx/>
-        <a:latin typeface="+mj-lt"/>
-        <a:ea typeface="+mj-ea"/>
-        <a:cs typeface="+mj-cs"/>
-        <a:sym typeface="Helvetica"/>
+        <a:latin typeface="+mn-lt"/>
+        <a:ea typeface="+mn-ea"/>
+        <a:cs typeface="+mn-cs"/>
+        <a:sym typeface="Calibri"/>
       </a:defRPr>
     </a:lvl3pPr>
     <a:lvl4pPr marL="0" marR="0" indent="0" algn="l" defTabSz="914400" rtl="0" fontAlgn="auto" latinLnBrk="0" hangingPunct="0">
@@ -153,10 +153,10 @@
         </a:solidFill>
         <a:effectLst/>
         <a:uFillTx/>
-        <a:latin typeface="+mj-lt"/>
-        <a:ea typeface="+mj-ea"/>
-        <a:cs typeface="+mj-cs"/>
-        <a:sym typeface="Helvetica"/>
+        <a:latin typeface="+mn-lt"/>
+        <a:ea typeface="+mn-ea"/>
+        <a:cs typeface="+mn-cs"/>
+        <a:sym typeface="Calibri"/>
       </a:defRPr>
     </a:lvl4pPr>
     <a:lvl5pPr marL="0" marR="0" indent="0" algn="l" defTabSz="914400" rtl="0" fontAlgn="auto" latinLnBrk="0" hangingPunct="0">
@@ -183,10 +183,10 @@
         </a:solidFill>
         <a:effectLst/>
         <a:uFillTx/>
-        <a:latin typeface="+mj-lt"/>
-        <a:ea typeface="+mj-ea"/>
-        <a:cs typeface="+mj-cs"/>
-        <a:sym typeface="Helvetica"/>
+        <a:latin typeface="+mn-lt"/>
+        <a:ea typeface="+mn-ea"/>
+        <a:cs typeface="+mn-cs"/>
+        <a:sym typeface="Calibri"/>
       </a:defRPr>
     </a:lvl5pPr>
     <a:lvl6pPr marL="0" marR="0" indent="0" algn="l" defTabSz="914400" rtl="0" fontAlgn="auto" latinLnBrk="0" hangingPunct="0">
@@ -213,10 +213,10 @@
         </a:solidFill>
         <a:effectLst/>
         <a:uFillTx/>
-        <a:latin typeface="+mj-lt"/>
-        <a:ea typeface="+mj-ea"/>
-        <a:cs typeface="+mj-cs"/>
-        <a:sym typeface="Helvetica"/>
+        <a:latin typeface="+mn-lt"/>
+        <a:ea typeface="+mn-ea"/>
+        <a:cs typeface="+mn-cs"/>
+        <a:sym typeface="Calibri"/>
       </a:defRPr>
     </a:lvl6pPr>
     <a:lvl7pPr marL="0" marR="0" indent="0" algn="l" defTabSz="914400" rtl="0" fontAlgn="auto" latinLnBrk="0" hangingPunct="0">
@@ -243,10 +243,10 @@
         </a:solidFill>
         <a:effectLst/>
         <a:uFillTx/>
-        <a:latin typeface="+mj-lt"/>
-        <a:ea typeface="+mj-ea"/>
-        <a:cs typeface="+mj-cs"/>
-        <a:sym typeface="Helvetica"/>
+        <a:latin typeface="+mn-lt"/>
+        <a:ea typeface="+mn-ea"/>
+        <a:cs typeface="+mn-cs"/>
+        <a:sym typeface="Calibri"/>
       </a:defRPr>
     </a:lvl7pPr>
     <a:lvl8pPr marL="0" marR="0" indent="0" algn="l" defTabSz="914400" rtl="0" fontAlgn="auto" latinLnBrk="0" hangingPunct="0">
@@ -273,10 +273,10 @@
         </a:solidFill>
         <a:effectLst/>
         <a:uFillTx/>
-        <a:latin typeface="+mj-lt"/>
-        <a:ea typeface="+mj-ea"/>
-        <a:cs typeface="+mj-cs"/>
-        <a:sym typeface="Helvetica"/>
+        <a:latin typeface="+mn-lt"/>
+        <a:ea typeface="+mn-ea"/>
+        <a:cs typeface="+mn-cs"/>
+        <a:sym typeface="Calibri"/>
       </a:defRPr>
     </a:lvl8pPr>
     <a:lvl9pPr marL="0" marR="0" indent="0" algn="l" defTabSz="914400" rtl="0" fontAlgn="auto" latinLnBrk="0" hangingPunct="0">
@@ -303,10 +303,10 @@
         </a:solidFill>
         <a:effectLst/>
         <a:uFillTx/>
-        <a:latin typeface="+mj-lt"/>
-        <a:ea typeface="+mj-ea"/>
-        <a:cs typeface="+mj-cs"/>
-        <a:sym typeface="Helvetica"/>
+        <a:latin typeface="+mn-lt"/>
+        <a:ea typeface="+mn-ea"/>
+        <a:cs typeface="+mn-cs"/>
+        <a:sym typeface="Calibri"/>
       </a:defRPr>
     </a:lvl9pPr>
   </p:defaultTextStyle>
@@ -642,8 +642,8 @@
         </p:nvSpPr>
         <p:spPr>
           <a:xfrm>
-            <a:off x="8463946" y="6224224"/>
-            <a:ext cx="273654" cy="264253"/>
+            <a:off x="8463948" y="6224225"/>
+            <a:ext cx="273653" cy="264251"/>
           </a:xfrm>
           <a:prstGeom prst="rect">
             <a:avLst/>
@@ -1409,42 +1409,87 @@
           <a:chExt cx="0" cy="0"/>
         </a:xfrm>
       </p:grpSpPr>
+      <p:sp>
+        <p:nvSpPr>
+          <p:cNvPr id="20" name="Rectangle 55"/>
+          <p:cNvSpPr txBox="1"/>
+          <p:nvPr/>
+        </p:nvSpPr>
+        <p:spPr>
+          <a:xfrm>
+            <a:off x="2213925" y="1116493"/>
+            <a:ext cx="2487329" cy="287317"/>
+          </a:xfrm>
+          <a:prstGeom prst="rect">
+            <a:avLst/>
+          </a:prstGeom>
+          <a:ln w="12700">
+            <a:miter lim="400000"/>
+          </a:ln>
+          <a:extLst>
+            <a:ext uri="{C572A759-6A51-4108-AA02-DFA0A04FC94B}">
+              <ma14:wrappingTextBoxFlag xmlns:ma14="http://schemas.microsoft.com/office/mac/drawingml/2011/main" val="1"/>
+            </a:ext>
+          </a:extLst>
+        </p:spPr>
+        <p:txBody>
+          <a:bodyPr lIns="45718" tIns="45718" rIns="45718" bIns="45718"/>
+          <a:lstStyle>
+            <a:lvl1pPr>
+              <a:defRPr sz="1200">
+                <a:solidFill>
+                  <a:srgbClr val="1E8900"/>
+                </a:solidFill>
+                <a:latin typeface="Arial"/>
+                <a:ea typeface="Arial"/>
+                <a:cs typeface="Arial"/>
+                <a:sym typeface="Arial"/>
+              </a:defRPr>
+            </a:lvl1pPr>
+          </a:lstStyle>
+          <a:p>
+            <a:pPr/>
+            <a:r>
+              <a:t>Public subnet</a:t>
+            </a:r>
+          </a:p>
+        </p:txBody>
+      </p:sp>
       <p:grpSp>
         <p:nvGrpSpPr>
-          <p:cNvPr id="22" name="Rectangle 55"/>
+          <p:cNvPr id="23" name="Rectangle 56"/>
           <p:cNvGrpSpPr/>
           <p:nvPr/>
         </p:nvGrpSpPr>
         <p:grpSpPr>
           <a:xfrm>
-            <a:off x="1377604" y="1553519"/>
-            <a:ext cx="2649889" cy="1924283"/>
+            <a:off x="898441" y="584740"/>
+            <a:ext cx="10061167" cy="5296212"/>
             <a:chOff x="-1" y="0"/>
-            <a:chExt cx="2649888" cy="1924281"/>
+            <a:chExt cx="10061166" cy="5296210"/>
           </a:xfrm>
         </p:grpSpPr>
         <p:sp>
           <p:nvSpPr>
-            <p:cNvPr id="20" name="Rectangle"/>
+            <p:cNvPr id="21" name="Rectangle"/>
             <p:cNvSpPr/>
             <p:nvPr/>
           </p:nvSpPr>
           <p:spPr>
             <a:xfrm>
-              <a:off x="-2" y="-1"/>
-              <a:ext cx="2649889" cy="1924283"/>
+              <a:off x="-2" y="0"/>
+              <a:ext cx="10061168" cy="5296211"/>
             </a:xfrm>
             <a:prstGeom prst="rect">
               <a:avLst/>
             </a:prstGeom>
-            <a:solidFill>
-              <a:schemeClr val="accent5">
-                <a:alpha val="9804"/>
-              </a:schemeClr>
-            </a:solidFill>
+            <a:noFill/>
             <a:ln w="12700" cap="flat">
-              <a:noFill/>
-              <a:miter lim="400000"/>
+              <a:solidFill>
+                <a:srgbClr val="1E8900"/>
+              </a:solidFill>
+              <a:prstDash val="solid"/>
+              <a:miter lim="800000"/>
             </a:ln>
             <a:effectLst/>
           </p:spPr>
@@ -1470,14 +1515,14 @@
         </p:sp>
         <p:sp>
           <p:nvSpPr>
-            <p:cNvPr id="21" name="Public subnet"/>
+            <p:cNvPr id="22" name="VPC"/>
             <p:cNvSpPr txBox="1"/>
             <p:nvPr/>
           </p:nvSpPr>
           <p:spPr>
             <a:xfrm>
-              <a:off x="313293" y="-1"/>
-              <a:ext cx="2287643" cy="264253"/>
+              <a:off x="543003" y="67669"/>
+              <a:ext cx="9450494" cy="343416"/>
             </a:xfrm>
             <a:prstGeom prst="rect">
               <a:avLst/>
@@ -1496,228 +1541,7 @@
           </p:spPr>
           <p:txBody>
             <a:bodyPr wrap="square" lIns="45718" tIns="45718" rIns="45718" bIns="45718" numCol="1" anchor="t">
-              <a:spAutoFit/>
-            </a:bodyPr>
-            <a:lstStyle>
-              <a:lvl1pPr>
-                <a:defRPr sz="1200">
-                  <a:solidFill>
-                    <a:srgbClr val="1E8900"/>
-                  </a:solidFill>
-                  <a:latin typeface="Arial"/>
-                  <a:ea typeface="Arial"/>
-                  <a:cs typeface="Arial"/>
-                  <a:sym typeface="Arial"/>
-                </a:defRPr>
-              </a:lvl1pPr>
-            </a:lstStyle>
-            <a:p>
-              <a:pPr/>
-              <a:r>
-                <a:t>Public subnet</a:t>
-              </a:r>
-            </a:p>
-          </p:txBody>
-        </p:sp>
-      </p:grpSp>
-      <p:grpSp>
-        <p:nvGrpSpPr>
-          <p:cNvPr id="25" name="Rectangle 52"/>
-          <p:cNvGrpSpPr/>
-          <p:nvPr/>
-        </p:nvGrpSpPr>
-        <p:grpSpPr>
-          <a:xfrm>
-            <a:off x="5601023" y="1552881"/>
-            <a:ext cx="3683664" cy="1915131"/>
-            <a:chOff x="0" y="0"/>
-            <a:chExt cx="3683662" cy="1915131"/>
-          </a:xfrm>
-        </p:grpSpPr>
-        <p:sp>
-          <p:nvSpPr>
-            <p:cNvPr id="23" name="Rectangle"/>
-            <p:cNvSpPr/>
-            <p:nvPr/>
-          </p:nvSpPr>
-          <p:spPr>
-            <a:xfrm>
-              <a:off x="-1" y="10429"/>
-              <a:ext cx="2637293" cy="1904703"/>
-            </a:xfrm>
-            <a:prstGeom prst="rect">
-              <a:avLst/>
-            </a:prstGeom>
-            <a:solidFill>
-              <a:schemeClr val="accent5">
-                <a:alpha val="9804"/>
-              </a:schemeClr>
-            </a:solidFill>
-            <a:ln w="12700" cap="flat">
-              <a:noFill/>
-              <a:miter lim="400000"/>
-            </a:ln>
-            <a:effectLst/>
-          </p:spPr>
-          <p:txBody>
-            <a:bodyPr wrap="square" lIns="45718" tIns="45718" rIns="45718" bIns="45718" numCol="1" anchor="t">
               <a:noAutofit/>
-            </a:bodyPr>
-            <a:lstStyle/>
-            <a:p>
-              <a:pPr>
-                <a:defRPr>
-                  <a:solidFill>
-                    <a:srgbClr val="FAFAFA"/>
-                  </a:solidFill>
-                  <a:latin typeface="Arial"/>
-                  <a:ea typeface="Arial"/>
-                  <a:cs typeface="Arial"/>
-                  <a:sym typeface="Arial"/>
-                </a:defRPr>
-              </a:pPr>
-            </a:p>
-          </p:txBody>
-        </p:sp>
-        <p:sp>
-          <p:nvSpPr>
-            <p:cNvPr id="24" name="Public subnet"/>
-            <p:cNvSpPr txBox="1"/>
-            <p:nvPr/>
-          </p:nvSpPr>
-          <p:spPr>
-            <a:xfrm>
-              <a:off x="1406893" y="-1"/>
-              <a:ext cx="2276770" cy="264254"/>
-            </a:xfrm>
-            <a:prstGeom prst="rect">
-              <a:avLst/>
-            </a:prstGeom>
-            <a:noFill/>
-            <a:ln w="12700" cap="flat">
-              <a:noFill/>
-              <a:miter lim="400000"/>
-            </a:ln>
-            <a:effectLst/>
-            <a:extLst>
-              <a:ext uri="{C572A759-6A51-4108-AA02-DFA0A04FC94B}">
-                <ma14:wrappingTextBoxFlag xmlns:ma14="http://schemas.microsoft.com/office/mac/drawingml/2011/main" val="1"/>
-              </a:ext>
-            </a:extLst>
-          </p:spPr>
-          <p:txBody>
-            <a:bodyPr wrap="square" lIns="45718" tIns="45718" rIns="45718" bIns="45718" numCol="1" anchor="t">
-              <a:spAutoFit/>
-            </a:bodyPr>
-            <a:lstStyle>
-              <a:lvl1pPr>
-                <a:defRPr sz="1200">
-                  <a:solidFill>
-                    <a:srgbClr val="1E8900"/>
-                  </a:solidFill>
-                  <a:latin typeface="Arial"/>
-                  <a:ea typeface="Arial"/>
-                  <a:cs typeface="Arial"/>
-                  <a:sym typeface="Arial"/>
-                </a:defRPr>
-              </a:lvl1pPr>
-            </a:lstStyle>
-            <a:p>
-              <a:pPr/>
-              <a:r>
-                <a:t>Public subnet</a:t>
-              </a:r>
-            </a:p>
-          </p:txBody>
-        </p:sp>
-      </p:grpSp>
-      <p:grpSp>
-        <p:nvGrpSpPr>
-          <p:cNvPr id="28" name="Rectangle 56"/>
-          <p:cNvGrpSpPr/>
-          <p:nvPr/>
-        </p:nvGrpSpPr>
-        <p:grpSpPr>
-          <a:xfrm>
-            <a:off x="898442" y="1195188"/>
-            <a:ext cx="7741843" cy="4075314"/>
-            <a:chOff x="0" y="0"/>
-            <a:chExt cx="7741842" cy="4075312"/>
-          </a:xfrm>
-        </p:grpSpPr>
-        <p:sp>
-          <p:nvSpPr>
-            <p:cNvPr id="26" name="Rectangle"/>
-            <p:cNvSpPr/>
-            <p:nvPr/>
-          </p:nvSpPr>
-          <p:spPr>
-            <a:xfrm>
-              <a:off x="-1" y="0"/>
-              <a:ext cx="7741843" cy="4075314"/>
-            </a:xfrm>
-            <a:prstGeom prst="rect">
-              <a:avLst/>
-            </a:prstGeom>
-            <a:noFill/>
-            <a:ln w="12700" cap="flat">
-              <a:solidFill>
-                <a:srgbClr val="1E8900"/>
-              </a:solidFill>
-              <a:prstDash val="solid"/>
-              <a:miter lim="800000"/>
-            </a:ln>
-            <a:effectLst/>
-          </p:spPr>
-          <p:txBody>
-            <a:bodyPr wrap="square" lIns="45718" tIns="45718" rIns="45718" bIns="45718" numCol="1" anchor="t">
-              <a:noAutofit/>
-            </a:bodyPr>
-            <a:lstStyle/>
-            <a:p>
-              <a:pPr>
-                <a:defRPr>
-                  <a:solidFill>
-                    <a:srgbClr val="FAFAFA"/>
-                  </a:solidFill>
-                  <a:latin typeface="Arial"/>
-                  <a:ea typeface="Arial"/>
-                  <a:cs typeface="Arial"/>
-                  <a:sym typeface="Arial"/>
-                </a:defRPr>
-              </a:pPr>
-            </a:p>
-          </p:txBody>
-        </p:sp>
-        <p:sp>
-          <p:nvSpPr>
-            <p:cNvPr id="27" name="VPC"/>
-            <p:cNvSpPr txBox="1"/>
-            <p:nvPr/>
-          </p:nvSpPr>
-          <p:spPr>
-            <a:xfrm>
-              <a:off x="417829" y="52070"/>
-              <a:ext cx="7271943" cy="264253"/>
-            </a:xfrm>
-            <a:prstGeom prst="rect">
-              <a:avLst/>
-            </a:prstGeom>
-            <a:noFill/>
-            <a:ln w="12700" cap="flat">
-              <a:noFill/>
-              <a:miter lim="400000"/>
-            </a:ln>
-            <a:effectLst/>
-            <a:extLst>
-              <a:ext uri="{C572A759-6A51-4108-AA02-DFA0A04FC94B}">
-                <ma14:wrappingTextBoxFlag xmlns:ma14="http://schemas.microsoft.com/office/mac/drawingml/2011/main" val="1"/>
-              </a:ext>
-            </a:extLst>
-          </p:spPr>
-          <p:txBody>
-            <a:bodyPr wrap="square" lIns="45718" tIns="45718" rIns="45718" bIns="45718" numCol="1" anchor="t">
-              <a:spAutoFit/>
             </a:bodyPr>
             <a:lstStyle>
               <a:lvl1pPr>
@@ -1743,28 +1567,28 @@
       </p:grpSp>
       <p:grpSp>
         <p:nvGrpSpPr>
-          <p:cNvPr id="31" name="Rectangle 58"/>
+          <p:cNvPr id="26" name="Rectangle 58"/>
           <p:cNvGrpSpPr/>
           <p:nvPr/>
         </p:nvGrpSpPr>
         <p:grpSpPr>
           <a:xfrm>
-            <a:off x="706502" y="341187"/>
-            <a:ext cx="9585601" cy="5157916"/>
-            <a:chOff x="0" y="0"/>
-            <a:chExt cx="9585600" cy="5157915"/>
+            <a:off x="706500" y="341186"/>
+            <a:ext cx="10779000" cy="5800072"/>
+            <a:chOff x="-1" y="0"/>
+            <a:chExt cx="10778998" cy="5800071"/>
           </a:xfrm>
         </p:grpSpPr>
         <p:sp>
           <p:nvSpPr>
-            <p:cNvPr id="29" name="Rectangle"/>
+            <p:cNvPr id="24" name="Rectangle"/>
             <p:cNvSpPr/>
             <p:nvPr/>
           </p:nvSpPr>
           <p:spPr>
             <a:xfrm>
-              <a:off x="-1" y="-1"/>
-              <a:ext cx="9585601" cy="5157916"/>
+              <a:off x="-2" y="-1"/>
+              <a:ext cx="10779000" cy="5800072"/>
             </a:xfrm>
             <a:prstGeom prst="rect">
               <a:avLst/>
@@ -1801,14 +1625,14 @@
         </p:sp>
         <p:sp>
           <p:nvSpPr>
-            <p:cNvPr id="30" name="AWS Cloud"/>
+            <p:cNvPr id="25" name="AWS Cloud"/>
             <p:cNvSpPr txBox="1"/>
             <p:nvPr/>
           </p:nvSpPr>
           <p:spPr>
             <a:xfrm>
-              <a:off x="417829" y="52069"/>
-              <a:ext cx="9115701" cy="264253"/>
+              <a:off x="469848" y="58551"/>
+              <a:ext cx="10250597" cy="297150"/>
             </a:xfrm>
             <a:prstGeom prst="rect">
               <a:avLst/>
@@ -1827,7 +1651,7 @@
           </p:spPr>
           <p:txBody>
             <a:bodyPr wrap="square" lIns="45718" tIns="45718" rIns="45718" bIns="45718" numCol="1" anchor="t">
-              <a:spAutoFit/>
+              <a:noAutofit/>
             </a:bodyPr>
             <a:lstStyle>
               <a:lvl1pPr>
@@ -1853,28 +1677,28 @@
       </p:grpSp>
       <p:grpSp>
         <p:nvGrpSpPr>
-          <p:cNvPr id="34" name="Rectangle 59"/>
+          <p:cNvPr id="29" name="Rectangle 59"/>
           <p:cNvGrpSpPr/>
           <p:nvPr/>
         </p:nvGrpSpPr>
         <p:grpSpPr>
           <a:xfrm>
-            <a:off x="1300212" y="668854"/>
-            <a:ext cx="2927299" cy="4835882"/>
+            <a:off x="1267445" y="814905"/>
+            <a:ext cx="2927301" cy="4835883"/>
             <a:chOff x="0" y="0"/>
-            <a:chExt cx="2927298" cy="4835880"/>
+            <a:chExt cx="2927300" cy="4835881"/>
           </a:xfrm>
         </p:grpSpPr>
         <p:sp>
           <p:nvSpPr>
-            <p:cNvPr id="32" name="Rectangle"/>
+            <p:cNvPr id="27" name="Rectangle"/>
             <p:cNvSpPr/>
             <p:nvPr/>
           </p:nvSpPr>
           <p:spPr>
             <a:xfrm>
-              <a:off x="0" y="-1"/>
-              <a:ext cx="2927299" cy="4835881"/>
+              <a:off x="-1" y="-1"/>
+              <a:ext cx="2927301" cy="4835883"/>
             </a:xfrm>
             <a:prstGeom prst="rect">
               <a:avLst/>
@@ -1911,14 +1735,14 @@
         </p:sp>
         <p:sp>
           <p:nvSpPr>
-            <p:cNvPr id="33" name="Availability Zone 1"/>
+            <p:cNvPr id="28" name="Availability Zone 1"/>
             <p:cNvSpPr txBox="1"/>
             <p:nvPr/>
           </p:nvSpPr>
           <p:spPr>
             <a:xfrm>
-              <a:off x="54786" y="54787"/>
-              <a:ext cx="2817726" cy="264253"/>
+              <a:off x="54785" y="54787"/>
+              <a:ext cx="2817729" cy="264251"/>
             </a:xfrm>
             <a:prstGeom prst="rect">
               <a:avLst/>
@@ -1963,7 +1787,7 @@
       </p:grpSp>
       <p:pic>
         <p:nvPicPr>
-          <p:cNvPr id="35" name="Graphic 61" descr="Graphic 61"/>
+          <p:cNvPr id="30" name="Graphic 61" descr="Graphic 61"/>
           <p:cNvPicPr>
             <a:picLocks noChangeAspect="1"/>
           </p:cNvPicPr>
@@ -1980,7 +1804,7 @@
         <p:spPr>
           <a:xfrm>
             <a:off x="706504" y="341189"/>
-            <a:ext cx="330202" cy="330202"/>
+            <a:ext cx="330203" cy="330203"/>
           </a:xfrm>
           <a:prstGeom prst="rect">
             <a:avLst/>
@@ -1992,7 +1816,7 @@
       </p:pic>
       <p:pic>
         <p:nvPicPr>
-          <p:cNvPr id="36" name="Graphic 62" descr="Graphic 62"/>
+          <p:cNvPr id="31" name="Graphic 62" descr="Graphic 62"/>
           <p:cNvPicPr>
             <a:picLocks noChangeAspect="1"/>
           </p:cNvPicPr>
@@ -2007,10 +1831,6 @@
           </a:stretch>
         </p:blipFill>
         <p:spPr>
-          <a:xfrm>
-            <a:off x="898443" y="1195187"/>
-            <a:ext cx="330202" cy="330202"/>
-          </a:xfrm>
           <a:prstGeom prst="rect">
             <a:avLst/>
           </a:prstGeom>
@@ -2021,7 +1841,7 @@
       </p:pic>
       <p:pic>
         <p:nvPicPr>
-          <p:cNvPr id="37" name="Graphic 63" descr="Graphic 63"/>
+          <p:cNvPr id="32" name="Graphic 63" descr="Graphic 63"/>
           <p:cNvPicPr>
             <a:picLocks noChangeAspect="1"/>
           </p:cNvPicPr>
@@ -2037,8 +1857,8 @@
         </p:blipFill>
         <p:spPr>
           <a:xfrm>
-            <a:off x="1465084" y="1551162"/>
-            <a:ext cx="274322" cy="274322"/>
+            <a:off x="1275509" y="845343"/>
+            <a:ext cx="274323" cy="274323"/>
           </a:xfrm>
           <a:prstGeom prst="rect">
             <a:avLst/>
@@ -2050,14 +1870,14 @@
       </p:pic>
       <p:sp>
         <p:nvSpPr>
-          <p:cNvPr id="38" name="TextBox 65"/>
+          <p:cNvPr id="33" name="TextBox 65"/>
           <p:cNvSpPr txBox="1"/>
           <p:nvPr/>
         </p:nvSpPr>
         <p:spPr>
           <a:xfrm>
-            <a:off x="1387143" y="2515660"/>
-            <a:ext cx="1061740" cy="264254"/>
+            <a:off x="2048848" y="2061484"/>
+            <a:ext cx="1061741" cy="264252"/>
           </a:xfrm>
           <a:prstGeom prst="rect">
             <a:avLst/>
@@ -2095,7 +1915,7 @@
       </p:sp>
       <p:pic>
         <p:nvPicPr>
-          <p:cNvPr id="39" name="Graphic 66" descr="Graphic 66"/>
+          <p:cNvPr id="34" name="Graphic 66" descr="Graphic 66"/>
           <p:cNvPicPr>
             <a:picLocks noChangeAspect="1"/>
           </p:cNvPicPr>
@@ -2111,8 +1931,8 @@
         </p:blipFill>
         <p:spPr>
           <a:xfrm>
-            <a:off x="1555453" y="1936550"/>
-            <a:ext cx="469903" cy="469902"/>
+            <a:off x="2344766" y="1494975"/>
+            <a:ext cx="469904" cy="469903"/>
           </a:xfrm>
           <a:prstGeom prst="rect">
             <a:avLst/>
@@ -2124,28 +1944,28 @@
       </p:pic>
       <p:grpSp>
         <p:nvGrpSpPr>
-          <p:cNvPr id="42" name="Rectangle 80"/>
+          <p:cNvPr id="37" name="Rectangle 80"/>
           <p:cNvGrpSpPr/>
           <p:nvPr/>
         </p:nvGrpSpPr>
         <p:grpSpPr>
           <a:xfrm>
-            <a:off x="5517334" y="678900"/>
-            <a:ext cx="2927299" cy="4825580"/>
-            <a:chOff x="0" y="-1"/>
-            <a:chExt cx="2927298" cy="4825579"/>
+            <a:off x="7578353" y="820055"/>
+            <a:ext cx="2927302" cy="4825582"/>
+            <a:chOff x="-1" y="-1"/>
+            <a:chExt cx="2927300" cy="4825581"/>
           </a:xfrm>
         </p:grpSpPr>
         <p:sp>
           <p:nvSpPr>
-            <p:cNvPr id="40" name="Rectangle"/>
+            <p:cNvPr id="35" name="Rectangle"/>
             <p:cNvSpPr/>
             <p:nvPr/>
           </p:nvSpPr>
           <p:spPr>
             <a:xfrm>
-              <a:off x="-1" y="-2"/>
-              <a:ext cx="2927300" cy="4825580"/>
+              <a:off x="-2" y="-2"/>
+              <a:ext cx="2927302" cy="4825582"/>
             </a:xfrm>
             <a:prstGeom prst="rect">
               <a:avLst/>
@@ -2182,14 +2002,14 @@
         </p:sp>
         <p:sp>
           <p:nvSpPr>
-            <p:cNvPr id="41" name="Availability Zone 2"/>
+            <p:cNvPr id="36" name="Availability Zone 2"/>
             <p:cNvSpPr txBox="1"/>
             <p:nvPr/>
           </p:nvSpPr>
           <p:spPr>
             <a:xfrm>
-              <a:off x="54786" y="54786"/>
-              <a:ext cx="2817724" cy="264254"/>
+              <a:off x="54785" y="54786"/>
+              <a:ext cx="2817727" cy="264252"/>
             </a:xfrm>
             <a:prstGeom prst="rect">
               <a:avLst/>
@@ -2226,7 +2046,7 @@
             <a:p>
               <a:pPr/>
               <a:r>
-                <a:t>Availability Zone 2</a:t>
+                <a:t>Availability Zone 3</a:t>
               </a:r>
             </a:p>
           </p:txBody>
@@ -2234,7 +2054,7 @@
       </p:grpSp>
       <p:pic>
         <p:nvPicPr>
-          <p:cNvPr id="43" name="Graphic 81" descr="Graphic 81"/>
+          <p:cNvPr id="38" name="Graphic 81" descr="Graphic 81"/>
           <p:cNvPicPr>
             <a:picLocks noChangeAspect="1"/>
           </p:cNvPicPr>
@@ -2249,10 +2069,6 @@
           </a:stretch>
         </p:blipFill>
         <p:spPr>
-          <a:xfrm>
-            <a:off x="7997538" y="1551162"/>
-            <a:ext cx="274322" cy="274322"/>
-          </a:xfrm>
           <a:prstGeom prst="rect">
             <a:avLst/>
           </a:prstGeom>
@@ -2263,14 +2079,14 @@
       </p:pic>
       <p:sp>
         <p:nvSpPr>
-          <p:cNvPr id="44" name="TextBox 83"/>
+          <p:cNvPr id="39" name="TextBox 83"/>
           <p:cNvSpPr txBox="1"/>
           <p:nvPr/>
         </p:nvSpPr>
         <p:spPr>
           <a:xfrm>
-            <a:off x="7241848" y="2510446"/>
-            <a:ext cx="1067787" cy="264254"/>
+            <a:off x="5395130" y="2056043"/>
+            <a:ext cx="1067788" cy="264251"/>
           </a:xfrm>
           <a:prstGeom prst="rect">
             <a:avLst/>
@@ -2308,7 +2124,7 @@
       </p:sp>
       <p:pic>
         <p:nvPicPr>
-          <p:cNvPr id="45" name="Graphic 84" descr="Graphic 84"/>
+          <p:cNvPr id="40" name="Graphic 84" descr="Graphic 84"/>
           <p:cNvPicPr>
             <a:picLocks noChangeAspect="1"/>
           </p:cNvPicPr>
@@ -2324,8 +2140,8 @@
         </p:blipFill>
         <p:spPr>
           <a:xfrm>
-            <a:off x="7616377" y="1936550"/>
-            <a:ext cx="469902" cy="469902"/>
+            <a:off x="5694074" y="1494976"/>
+            <a:ext cx="469903" cy="469903"/>
           </a:xfrm>
           <a:prstGeom prst="rect">
             <a:avLst/>
@@ -2337,14 +2153,14 @@
       </p:pic>
       <p:sp>
         <p:nvSpPr>
-          <p:cNvPr id="46" name="Rectangle"/>
+          <p:cNvPr id="41" name="Rectangle"/>
           <p:cNvSpPr/>
           <p:nvPr/>
         </p:nvSpPr>
         <p:spPr>
           <a:xfrm>
-            <a:off x="2631338" y="1938945"/>
-            <a:ext cx="4428054" cy="1265385"/>
+            <a:off x="1899354" y="2854381"/>
+            <a:ext cx="8059340" cy="1681329"/>
           </a:xfrm>
           <a:prstGeom prst="rect">
             <a:avLst/>
@@ -2380,7 +2196,7 @@
       </p:sp>
       <p:pic>
         <p:nvPicPr>
-          <p:cNvPr id="47" name="Graphic 60" descr="Graphic 60"/>
+          <p:cNvPr id="42" name="Graphic 60" descr="Graphic 60"/>
           <p:cNvPicPr>
             <a:picLocks noChangeAspect="1"/>
           </p:cNvPicPr>
@@ -2396,8 +2212,8 @@
         </p:blipFill>
         <p:spPr>
           <a:xfrm>
-            <a:off x="4707321" y="1764748"/>
-            <a:ext cx="330202" cy="330202"/>
+            <a:off x="5686534" y="2713812"/>
+            <a:ext cx="330203" cy="330203"/>
           </a:xfrm>
           <a:prstGeom prst="rect">
             <a:avLst/>
@@ -2409,14 +2225,14 @@
       </p:pic>
       <p:sp>
         <p:nvSpPr>
-          <p:cNvPr id="48" name="Auto Scaling group"/>
+          <p:cNvPr id="43" name="Auto Scaling group"/>
           <p:cNvSpPr txBox="1"/>
           <p:nvPr/>
         </p:nvSpPr>
         <p:spPr>
           <a:xfrm>
-            <a:off x="4092231" y="1950474"/>
-            <a:ext cx="1560382" cy="442054"/>
+            <a:off x="5071443" y="2929780"/>
+            <a:ext cx="1560383" cy="442051"/>
           </a:xfrm>
           <a:prstGeom prst="rect">
             <a:avLst/>
@@ -2471,7 +2287,7 @@
       </p:sp>
       <p:pic>
         <p:nvPicPr>
-          <p:cNvPr id="49" name="Res_Amazon-EC2_Instances_48_Light.png" descr="Res_Amazon-EC2_Instances_48_Light.png"/>
+          <p:cNvPr id="44" name="Res_Amazon-EC2_Instances_48_Light.png" descr="Res_Amazon-EC2_Instances_48_Light.png"/>
           <p:cNvPicPr>
             <a:picLocks noChangeAspect="1"/>
           </p:cNvPicPr>
@@ -2487,8 +2303,8 @@
         </p:blipFill>
         <p:spPr>
           <a:xfrm>
-            <a:off x="3084016" y="2205645"/>
-            <a:ext cx="609603" cy="609603"/>
+            <a:off x="2274919" y="3482087"/>
+            <a:ext cx="609604" cy="609604"/>
           </a:xfrm>
           <a:prstGeom prst="rect">
             <a:avLst/>
@@ -2500,7 +2316,7 @@
       </p:pic>
       <p:pic>
         <p:nvPicPr>
-          <p:cNvPr id="50" name="Res_Amazon-EC2_Instances_48_Light.png" descr="Res_Amazon-EC2_Instances_48_Light.png"/>
+          <p:cNvPr id="45" name="Res_Amazon-EC2_Instances_48_Light.png" descr="Res_Amazon-EC2_Instances_48_Light.png"/>
           <p:cNvPicPr>
             <a:picLocks noChangeAspect="1"/>
           </p:cNvPicPr>
@@ -2516,8 +2332,8 @@
         </p:blipFill>
         <p:spPr>
           <a:xfrm>
-            <a:off x="6026963" y="2205645"/>
-            <a:ext cx="609602" cy="609603"/>
+            <a:off x="8818729" y="3482087"/>
+            <a:ext cx="609603" cy="609604"/>
           </a:xfrm>
           <a:prstGeom prst="rect">
             <a:avLst/>
@@ -2529,14 +2345,14 @@
       </p:pic>
       <p:sp>
         <p:nvSpPr>
-          <p:cNvPr id="51" name="172.31.0.0/16"/>
+          <p:cNvPr id="46" name="172.31.0.0/16"/>
           <p:cNvSpPr txBox="1"/>
           <p:nvPr/>
         </p:nvSpPr>
         <p:spPr>
           <a:xfrm>
-            <a:off x="2955413" y="2868191"/>
-            <a:ext cx="1036324" cy="269239"/>
+            <a:off x="2074265" y="4093620"/>
+            <a:ext cx="1036322" cy="269237"/>
           </a:xfrm>
           <a:prstGeom prst="rect">
             <a:avLst/>
@@ -2556,7 +2372,12 @@
           </a:bodyPr>
           <a:lstStyle>
             <a:lvl1pPr>
-              <a:defRPr sz="1200"/>
+              <a:defRPr sz="1200">
+                <a:latin typeface="+mj-lt"/>
+                <a:ea typeface="+mj-ea"/>
+                <a:cs typeface="+mj-cs"/>
+                <a:sym typeface="Helvetica"/>
+              </a:defRPr>
             </a:lvl1pPr>
           </a:lstStyle>
           <a:p>
@@ -2569,14 +2390,14 @@
       </p:sp>
       <p:sp>
         <p:nvSpPr>
-          <p:cNvPr id="52" name="172.31.0.0/16"/>
+          <p:cNvPr id="47" name="172.31.0.0/16"/>
           <p:cNvSpPr txBox="1"/>
           <p:nvPr/>
         </p:nvSpPr>
         <p:spPr>
           <a:xfrm>
-            <a:off x="5898359" y="2868191"/>
-            <a:ext cx="1036324" cy="269239"/>
+            <a:off x="5309880" y="4093620"/>
+            <a:ext cx="1036322" cy="269237"/>
           </a:xfrm>
           <a:prstGeom prst="rect">
             <a:avLst/>
@@ -2596,7 +2417,570 @@
           </a:bodyPr>
           <a:lstStyle>
             <a:lvl1pPr>
-              <a:defRPr sz="1200"/>
+              <a:defRPr sz="1200">
+                <a:latin typeface="+mj-lt"/>
+                <a:ea typeface="+mj-ea"/>
+                <a:cs typeface="+mj-cs"/>
+                <a:sym typeface="Helvetica"/>
+              </a:defRPr>
+            </a:lvl1pPr>
+          </a:lstStyle>
+          <a:p>
+            <a:pPr/>
+            <a:r>
+              <a:t>172.31.0.0/16</a:t>
+            </a:r>
+          </a:p>
+        </p:txBody>
+      </p:sp>
+      <p:grpSp>
+        <p:nvGrpSpPr>
+          <p:cNvPr id="50" name="Rectangle 80"/>
+          <p:cNvGrpSpPr/>
+          <p:nvPr/>
+        </p:nvGrpSpPr>
+        <p:grpSpPr>
+          <a:xfrm>
+            <a:off x="4422899" y="820055"/>
+            <a:ext cx="2927301" cy="4825582"/>
+            <a:chOff x="-1" y="-1"/>
+            <a:chExt cx="2927300" cy="4825581"/>
+          </a:xfrm>
+        </p:grpSpPr>
+        <p:sp>
+          <p:nvSpPr>
+            <p:cNvPr id="48" name="Rectangle"/>
+            <p:cNvSpPr/>
+            <p:nvPr/>
+          </p:nvSpPr>
+          <p:spPr>
+            <a:xfrm>
+              <a:off x="-2" y="-2"/>
+              <a:ext cx="2927302" cy="4825582"/>
+            </a:xfrm>
+            <a:prstGeom prst="rect">
+              <a:avLst/>
+            </a:prstGeom>
+            <a:noFill/>
+            <a:ln w="12700" cap="flat">
+              <a:solidFill>
+                <a:srgbClr val="007DBC"/>
+              </a:solidFill>
+              <a:prstDash val="dash"/>
+              <a:miter lim="800000"/>
+            </a:ln>
+            <a:effectLst/>
+          </p:spPr>
+          <p:txBody>
+            <a:bodyPr wrap="square" lIns="45718" tIns="45718" rIns="45718" bIns="45718" numCol="1" anchor="t">
+              <a:noAutofit/>
+            </a:bodyPr>
+            <a:lstStyle/>
+            <a:p>
+              <a:pPr algn="ctr">
+                <a:defRPr>
+                  <a:solidFill>
+                    <a:srgbClr val="FAFAFA"/>
+                  </a:solidFill>
+                  <a:latin typeface="Arial"/>
+                  <a:ea typeface="Arial"/>
+                  <a:cs typeface="Arial"/>
+                  <a:sym typeface="Arial"/>
+                </a:defRPr>
+              </a:pPr>
+            </a:p>
+          </p:txBody>
+        </p:sp>
+        <p:sp>
+          <p:nvSpPr>
+            <p:cNvPr id="49" name="Availability Zone 2"/>
+            <p:cNvSpPr txBox="1"/>
+            <p:nvPr/>
+          </p:nvSpPr>
+          <p:spPr>
+            <a:xfrm>
+              <a:off x="54785" y="54786"/>
+              <a:ext cx="2817727" cy="264252"/>
+            </a:xfrm>
+            <a:prstGeom prst="rect">
+              <a:avLst/>
+            </a:prstGeom>
+            <a:noFill/>
+            <a:ln w="12700" cap="flat">
+              <a:noFill/>
+              <a:miter lim="400000"/>
+            </a:ln>
+            <a:effectLst/>
+            <a:extLst>
+              <a:ext uri="{C572A759-6A51-4108-AA02-DFA0A04FC94B}">
+                <ma14:wrappingTextBoxFlag xmlns:ma14="http://schemas.microsoft.com/office/mac/drawingml/2011/main" val="1"/>
+              </a:ext>
+            </a:extLst>
+          </p:spPr>
+          <p:txBody>
+            <a:bodyPr wrap="square" lIns="45718" tIns="45718" rIns="45718" bIns="45718" numCol="1" anchor="t">
+              <a:spAutoFit/>
+            </a:bodyPr>
+            <a:lstStyle>
+              <a:lvl1pPr algn="ctr">
+                <a:defRPr sz="1200">
+                  <a:solidFill>
+                    <a:srgbClr val="007DBC"/>
+                  </a:solidFill>
+                  <a:latin typeface="Arial"/>
+                  <a:ea typeface="Arial"/>
+                  <a:cs typeface="Arial"/>
+                  <a:sym typeface="Arial"/>
+                </a:defRPr>
+              </a:lvl1pPr>
+            </a:lstStyle>
+            <a:p>
+              <a:pPr/>
+              <a:r>
+                <a:t>Availability Zone 2</a:t>
+              </a:r>
+            </a:p>
+          </p:txBody>
+        </p:sp>
+      </p:grpSp>
+      <p:grpSp>
+        <p:nvGrpSpPr>
+          <p:cNvPr id="54" name="Rectangle 55"/>
+          <p:cNvGrpSpPr/>
+          <p:nvPr/>
+        </p:nvGrpSpPr>
+        <p:grpSpPr>
+          <a:xfrm>
+            <a:off x="1562441" y="1112946"/>
+            <a:ext cx="8961754" cy="4471229"/>
+            <a:chOff x="0" y="0"/>
+            <a:chExt cx="8961752" cy="4471227"/>
+          </a:xfrm>
+        </p:grpSpPr>
+        <p:sp>
+          <p:nvSpPr>
+            <p:cNvPr id="51" name="Rectangle"/>
+            <p:cNvSpPr/>
+            <p:nvPr/>
+          </p:nvSpPr>
+          <p:spPr>
+            <a:xfrm>
+              <a:off x="0" y="0"/>
+              <a:ext cx="2649890" cy="4471228"/>
+            </a:xfrm>
+            <a:prstGeom prst="rect">
+              <a:avLst/>
+            </a:prstGeom>
+            <a:solidFill>
+              <a:schemeClr val="accent5">
+                <a:alpha val="9804"/>
+              </a:schemeClr>
+            </a:solidFill>
+            <a:ln w="12700" cap="flat">
+              <a:noFill/>
+              <a:miter lim="400000"/>
+            </a:ln>
+            <a:effectLst/>
+          </p:spPr>
+          <p:txBody>
+            <a:bodyPr wrap="square" lIns="45718" tIns="45718" rIns="45718" bIns="45718" numCol="1" anchor="t">
+              <a:noAutofit/>
+            </a:bodyPr>
+            <a:lstStyle/>
+            <a:p>
+              <a:pPr>
+                <a:defRPr>
+                  <a:solidFill>
+                    <a:srgbClr val="FAFAFA"/>
+                  </a:solidFill>
+                  <a:latin typeface="Arial"/>
+                  <a:ea typeface="Arial"/>
+                  <a:cs typeface="Arial"/>
+                  <a:sym typeface="Arial"/>
+                </a:defRPr>
+              </a:pPr>
+            </a:p>
+          </p:txBody>
+        </p:sp>
+        <p:sp>
+          <p:nvSpPr>
+            <p:cNvPr id="52" name="Rectangle"/>
+            <p:cNvSpPr/>
+            <p:nvPr/>
+          </p:nvSpPr>
+          <p:spPr>
+            <a:xfrm>
+              <a:off x="3112795" y="0"/>
+              <a:ext cx="2649891" cy="4471228"/>
+            </a:xfrm>
+            <a:prstGeom prst="rect">
+              <a:avLst/>
+            </a:prstGeom>
+            <a:solidFill>
+              <a:schemeClr val="accent5">
+                <a:alpha val="9804"/>
+              </a:schemeClr>
+            </a:solidFill>
+            <a:ln w="12700" cap="flat">
+              <a:noFill/>
+              <a:miter lim="400000"/>
+            </a:ln>
+            <a:effectLst/>
+          </p:spPr>
+          <p:txBody>
+            <a:bodyPr wrap="square" lIns="45718" tIns="45718" rIns="45718" bIns="45718" numCol="1" anchor="t">
+              <a:noAutofit/>
+            </a:bodyPr>
+            <a:lstStyle/>
+            <a:p>
+              <a:pPr>
+                <a:defRPr>
+                  <a:solidFill>
+                    <a:srgbClr val="FAFAFA"/>
+                  </a:solidFill>
+                  <a:latin typeface="Arial"/>
+                  <a:ea typeface="Arial"/>
+                  <a:cs typeface="Arial"/>
+                  <a:sym typeface="Arial"/>
+                </a:defRPr>
+              </a:pPr>
+            </a:p>
+          </p:txBody>
+        </p:sp>
+        <p:sp>
+          <p:nvSpPr>
+            <p:cNvPr id="53" name="Rectangle"/>
+            <p:cNvSpPr/>
+            <p:nvPr/>
+          </p:nvSpPr>
+          <p:spPr>
+            <a:xfrm>
+              <a:off x="6311862" y="0"/>
+              <a:ext cx="2649891" cy="4471228"/>
+            </a:xfrm>
+            <a:prstGeom prst="rect">
+              <a:avLst/>
+            </a:prstGeom>
+            <a:solidFill>
+              <a:schemeClr val="accent5">
+                <a:alpha val="9804"/>
+              </a:schemeClr>
+            </a:solidFill>
+            <a:ln w="12700" cap="flat">
+              <a:noFill/>
+              <a:miter lim="400000"/>
+            </a:ln>
+            <a:effectLst/>
+          </p:spPr>
+          <p:txBody>
+            <a:bodyPr wrap="square" lIns="45718" tIns="45718" rIns="45718" bIns="45718" numCol="1" anchor="t">
+              <a:noAutofit/>
+            </a:bodyPr>
+            <a:lstStyle/>
+            <a:p>
+              <a:pPr>
+                <a:defRPr>
+                  <a:solidFill>
+                    <a:srgbClr val="FAFAFA"/>
+                  </a:solidFill>
+                  <a:latin typeface="Arial"/>
+                  <a:ea typeface="Arial"/>
+                  <a:cs typeface="Arial"/>
+                  <a:sym typeface="Arial"/>
+                </a:defRPr>
+              </a:pPr>
+            </a:p>
+          </p:txBody>
+        </p:sp>
+      </p:grpSp>
+      <p:pic>
+        <p:nvPicPr>
+          <p:cNvPr id="55" name="Graphic 63" descr="Graphic 63"/>
+          <p:cNvPicPr>
+            <a:picLocks noChangeAspect="1"/>
+          </p:cNvPicPr>
+          <p:nvPr/>
+        </p:nvPicPr>
+        <p:blipFill>
+          <a:blip r:embed="rId4">
+            <a:extLst/>
+          </a:blip>
+          <a:stretch>
+            <a:fillRect/>
+          </a:stretch>
+        </p:blipFill>
+        <p:spPr>
+          <a:xfrm>
+            <a:off x="4426931" y="845343"/>
+            <a:ext cx="274323" cy="274323"/>
+          </a:xfrm>
+          <a:prstGeom prst="rect">
+            <a:avLst/>
+          </a:prstGeom>
+          <a:ln w="12700">
+            <a:miter lim="400000"/>
+          </a:ln>
+        </p:spPr>
+      </p:pic>
+      <p:pic>
+        <p:nvPicPr>
+          <p:cNvPr id="56" name="Graphic 63" descr="Graphic 63"/>
+          <p:cNvPicPr>
+            <a:picLocks noChangeAspect="1"/>
+          </p:cNvPicPr>
+          <p:nvPr/>
+        </p:nvPicPr>
+        <p:blipFill>
+          <a:blip r:embed="rId4">
+            <a:extLst/>
+          </a:blip>
+          <a:stretch>
+            <a:fillRect/>
+          </a:stretch>
+        </p:blipFill>
+        <p:spPr>
+          <a:xfrm>
+            <a:off x="7582386" y="845343"/>
+            <a:ext cx="274323" cy="274323"/>
+          </a:xfrm>
+          <a:prstGeom prst="rect">
+            <a:avLst/>
+          </a:prstGeom>
+          <a:ln w="12700">
+            <a:miter lim="400000"/>
+          </a:ln>
+        </p:spPr>
+      </p:pic>
+      <p:sp>
+        <p:nvSpPr>
+          <p:cNvPr id="57" name="Rectangle 55"/>
+          <p:cNvSpPr txBox="1"/>
+          <p:nvPr/>
+        </p:nvSpPr>
+        <p:spPr>
+          <a:xfrm>
+            <a:off x="5309880" y="1116493"/>
+            <a:ext cx="2487329" cy="287317"/>
+          </a:xfrm>
+          <a:prstGeom prst="rect">
+            <a:avLst/>
+          </a:prstGeom>
+          <a:ln w="12700">
+            <a:miter lim="400000"/>
+          </a:ln>
+          <a:extLst>
+            <a:ext uri="{C572A759-6A51-4108-AA02-DFA0A04FC94B}">
+              <ma14:wrappingTextBoxFlag xmlns:ma14="http://schemas.microsoft.com/office/mac/drawingml/2011/main" val="1"/>
+            </a:ext>
+          </a:extLst>
+        </p:spPr>
+        <p:txBody>
+          <a:bodyPr lIns="45718" tIns="45718" rIns="45718" bIns="45718"/>
+          <a:lstStyle>
+            <a:lvl1pPr>
+              <a:defRPr sz="1200">
+                <a:solidFill>
+                  <a:srgbClr val="1E8900"/>
+                </a:solidFill>
+                <a:latin typeface="Arial"/>
+                <a:ea typeface="Arial"/>
+                <a:cs typeface="Arial"/>
+                <a:sym typeface="Arial"/>
+              </a:defRPr>
+            </a:lvl1pPr>
+          </a:lstStyle>
+          <a:p>
+            <a:pPr/>
+            <a:r>
+              <a:t>Public subnet</a:t>
+            </a:r>
+          </a:p>
+        </p:txBody>
+      </p:sp>
+      <p:sp>
+        <p:nvSpPr>
+          <p:cNvPr id="58" name="Rectangle 55"/>
+          <p:cNvSpPr txBox="1"/>
+          <p:nvPr/>
+        </p:nvSpPr>
+        <p:spPr>
+          <a:xfrm>
+            <a:off x="8523842" y="1116493"/>
+            <a:ext cx="2487329" cy="287317"/>
+          </a:xfrm>
+          <a:prstGeom prst="rect">
+            <a:avLst/>
+          </a:prstGeom>
+          <a:ln w="12700">
+            <a:miter lim="400000"/>
+          </a:ln>
+          <a:extLst>
+            <a:ext uri="{C572A759-6A51-4108-AA02-DFA0A04FC94B}">
+              <ma14:wrappingTextBoxFlag xmlns:ma14="http://schemas.microsoft.com/office/mac/drawingml/2011/main" val="1"/>
+            </a:ext>
+          </a:extLst>
+        </p:spPr>
+        <p:txBody>
+          <a:bodyPr lIns="45718" tIns="45718" rIns="45718" bIns="45718"/>
+          <a:lstStyle>
+            <a:lvl1pPr>
+              <a:defRPr sz="1200">
+                <a:solidFill>
+                  <a:srgbClr val="1E8900"/>
+                </a:solidFill>
+                <a:latin typeface="Arial"/>
+                <a:ea typeface="Arial"/>
+                <a:cs typeface="Arial"/>
+                <a:sym typeface="Arial"/>
+              </a:defRPr>
+            </a:lvl1pPr>
+          </a:lstStyle>
+          <a:p>
+            <a:pPr/>
+            <a:r>
+              <a:t>Public subnet</a:t>
+            </a:r>
+          </a:p>
+        </p:txBody>
+      </p:sp>
+      <p:pic>
+        <p:nvPicPr>
+          <p:cNvPr id="59" name="Graphic 84" descr="Graphic 84"/>
+          <p:cNvPicPr>
+            <a:picLocks noChangeAspect="1"/>
+          </p:cNvPicPr>
+          <p:nvPr/>
+        </p:nvPicPr>
+        <p:blipFill>
+          <a:blip r:embed="rId5">
+            <a:extLst/>
+          </a:blip>
+          <a:stretch>
+            <a:fillRect/>
+          </a:stretch>
+        </p:blipFill>
+        <p:spPr>
+          <a:xfrm>
+            <a:off x="8888579" y="1494976"/>
+            <a:ext cx="469903" cy="469903"/>
+          </a:xfrm>
+          <a:prstGeom prst="rect">
+            <a:avLst/>
+          </a:prstGeom>
+          <a:ln w="12700">
+            <a:miter lim="400000"/>
+          </a:ln>
+        </p:spPr>
+      </p:pic>
+      <p:sp>
+        <p:nvSpPr>
+          <p:cNvPr id="60" name="TextBox 83"/>
+          <p:cNvSpPr txBox="1"/>
+          <p:nvPr/>
+        </p:nvSpPr>
+        <p:spPr>
+          <a:xfrm>
+            <a:off x="8662510" y="2056043"/>
+            <a:ext cx="1067788" cy="264251"/>
+          </a:xfrm>
+          <a:prstGeom prst="rect">
+            <a:avLst/>
+          </a:prstGeom>
+          <a:ln w="12700">
+            <a:miter lim="400000"/>
+          </a:ln>
+          <a:extLst>
+            <a:ext uri="{C572A759-6A51-4108-AA02-DFA0A04FC94B}">
+              <ma14:wrappingTextBoxFlag xmlns:ma14="http://schemas.microsoft.com/office/mac/drawingml/2011/main" val="1"/>
+            </a:ext>
+          </a:extLst>
+        </p:spPr>
+        <p:txBody>
+          <a:bodyPr lIns="45718" tIns="45718" rIns="45718" bIns="45718">
+            <a:spAutoFit/>
+          </a:bodyPr>
+          <a:lstStyle>
+            <a:lvl1pPr algn="ctr">
+              <a:defRPr sz="1200">
+                <a:latin typeface="Arial"/>
+                <a:ea typeface="Arial"/>
+                <a:cs typeface="Arial"/>
+                <a:sym typeface="Arial"/>
+              </a:defRPr>
+            </a:lvl1pPr>
+          </a:lstStyle>
+          <a:p>
+            <a:pPr/>
+            <a:r>
+              <a:t>NAT gateway</a:t>
+            </a:r>
+          </a:p>
+        </p:txBody>
+      </p:sp>
+      <p:pic>
+        <p:nvPicPr>
+          <p:cNvPr id="61" name="Res_Amazon-EC2_Instances_48_Light.png" descr="Res_Amazon-EC2_Instances_48_Light.png"/>
+          <p:cNvPicPr>
+            <a:picLocks noChangeAspect="1"/>
+          </p:cNvPicPr>
+          <p:nvPr/>
+        </p:nvPicPr>
+        <p:blipFill>
+          <a:blip r:embed="rId7">
+            <a:extLst/>
+          </a:blip>
+          <a:stretch>
+            <a:fillRect/>
+          </a:stretch>
+        </p:blipFill>
+        <p:spPr>
+          <a:xfrm>
+            <a:off x="5523242" y="3482087"/>
+            <a:ext cx="609603" cy="609604"/>
+          </a:xfrm>
+          <a:prstGeom prst="rect">
+            <a:avLst/>
+          </a:prstGeom>
+          <a:ln w="12700">
+            <a:miter lim="400000"/>
+          </a:ln>
+        </p:spPr>
+      </p:pic>
+      <p:sp>
+        <p:nvSpPr>
+          <p:cNvPr id="62" name="172.31.0.0/16"/>
+          <p:cNvSpPr txBox="1"/>
+          <p:nvPr/>
+        </p:nvSpPr>
+        <p:spPr>
+          <a:xfrm>
+            <a:off x="8605367" y="4093620"/>
+            <a:ext cx="1036322" cy="269237"/>
+          </a:xfrm>
+          <a:prstGeom prst="rect">
+            <a:avLst/>
+          </a:prstGeom>
+          <a:ln w="12700">
+            <a:miter lim="400000"/>
+          </a:ln>
+          <a:extLst>
+            <a:ext uri="{C572A759-6A51-4108-AA02-DFA0A04FC94B}">
+              <ma14:wrappingTextBoxFlag xmlns:ma14="http://schemas.microsoft.com/office/mac/drawingml/2011/main" val="1"/>
+            </a:ext>
+          </a:extLst>
+        </p:spPr>
+        <p:txBody>
+          <a:bodyPr wrap="none" lIns="45718" tIns="45718" rIns="45718" bIns="45718">
+            <a:spAutoFit/>
+          </a:bodyPr>
+          <a:lstStyle>
+            <a:lvl1pPr>
+              <a:defRPr sz="1200">
+                <a:latin typeface="+mj-lt"/>
+                <a:ea typeface="+mj-ea"/>
+                <a:cs typeface="+mj-cs"/>
+                <a:sym typeface="Helvetica"/>
+              </a:defRPr>
             </a:lvl1pPr>
           </a:lstStyle>
           <a:p>
@@ -2847,10 +3231,10 @@
             </a:solidFill>
             <a:effectLst/>
             <a:uFillTx/>
-            <a:latin typeface="+mj-lt"/>
-            <a:ea typeface="+mj-ea"/>
-            <a:cs typeface="+mj-cs"/>
-            <a:sym typeface="Helvetica"/>
+            <a:latin typeface="+mn-lt"/>
+            <a:ea typeface="+mn-ea"/>
+            <a:cs typeface="+mn-cs"/>
+            <a:sym typeface="Calibri"/>
           </a:defRPr>
         </a:defPPr>
         <a:lvl1pPr marL="0" marR="0" indent="0" algn="l" defTabSz="914400" rtl="0" fontAlgn="auto" latinLnBrk="1" hangingPunct="0">
@@ -3418,10 +3802,10 @@
             </a:solidFill>
             <a:effectLst/>
             <a:uFillTx/>
-            <a:latin typeface="+mj-lt"/>
-            <a:ea typeface="+mj-ea"/>
-            <a:cs typeface="+mj-cs"/>
-            <a:sym typeface="Helvetica"/>
+            <a:latin typeface="+mn-lt"/>
+            <a:ea typeface="+mn-ea"/>
+            <a:cs typeface="+mn-cs"/>
+            <a:sym typeface="Calibri"/>
           </a:defRPr>
         </a:defPPr>
         <a:lvl1pPr marL="0" marR="0" indent="0" algn="l" defTabSz="914400" rtl="0" fontAlgn="auto" latinLnBrk="1" hangingPunct="0">
@@ -3901,10 +4285,10 @@
             </a:solidFill>
             <a:effectLst/>
             <a:uFillTx/>
-            <a:latin typeface="+mj-lt"/>
-            <a:ea typeface="+mj-ea"/>
-            <a:cs typeface="+mj-cs"/>
-            <a:sym typeface="Helvetica"/>
+            <a:latin typeface="+mn-lt"/>
+            <a:ea typeface="+mn-ea"/>
+            <a:cs typeface="+mn-cs"/>
+            <a:sym typeface="Calibri"/>
           </a:defRPr>
         </a:defPPr>
         <a:lvl1pPr marL="0" marR="0" indent="0" algn="l" defTabSz="914400" rtl="0" fontAlgn="auto" latinLnBrk="1" hangingPunct="0">
@@ -4472,10 +4856,10 @@
             </a:solidFill>
             <a:effectLst/>
             <a:uFillTx/>
-            <a:latin typeface="+mj-lt"/>
-            <a:ea typeface="+mj-ea"/>
-            <a:cs typeface="+mj-cs"/>
-            <a:sym typeface="Helvetica"/>
+            <a:latin typeface="+mn-lt"/>
+            <a:ea typeface="+mn-ea"/>
+            <a:cs typeface="+mn-cs"/>
+            <a:sym typeface="Calibri"/>
           </a:defRPr>
         </a:defPPr>
         <a:lvl1pPr marL="0" marR="0" indent="0" algn="l" defTabSz="914400" rtl="0" fontAlgn="auto" latinLnBrk="1" hangingPunct="0">

</xml_diff>

<commit_message>
Added more screenshots for login and modified the architect diagram a bit and more verbiage changes
</commit_message>
<xml_diff>
--- a/docs/images/neo4j_architecture_diagram.pptx
+++ b/docs/images/neo4j_architecture_diagram.pptx
@@ -1417,8 +1417,8 @@
         </p:nvSpPr>
         <p:spPr>
           <a:xfrm>
-            <a:off x="2189878" y="1212682"/>
-            <a:ext cx="2487329" cy="287317"/>
+            <a:off x="2189877" y="1212681"/>
+            <a:ext cx="2487330" cy="264252"/>
           </a:xfrm>
           <a:prstGeom prst="rect">
             <a:avLst/>
@@ -1433,7 +1433,9 @@
           </a:extLst>
         </p:spPr>
         <p:txBody>
-          <a:bodyPr lIns="45718" tIns="45718" rIns="45718" bIns="45718"/>
+          <a:bodyPr lIns="45718" tIns="45718" rIns="45718" bIns="45718">
+            <a:spAutoFit/>
+          </a:bodyPr>
           <a:lstStyle>
             <a:lvl1pPr>
               <a:defRPr sz="1200">
@@ -1463,10 +1465,10 @@
         </p:nvGrpSpPr>
         <p:grpSpPr>
           <a:xfrm>
-            <a:off x="898441" y="584740"/>
-            <a:ext cx="10061167" cy="5296212"/>
-            <a:chOff x="-1" y="0"/>
-            <a:chExt cx="10061166" cy="5296210"/>
+            <a:off x="898440" y="584739"/>
+            <a:ext cx="10061170" cy="5296214"/>
+            <a:chOff x="0" y="0"/>
+            <a:chExt cx="10061168" cy="5296213"/>
           </a:xfrm>
         </p:grpSpPr>
         <p:sp>
@@ -1477,8 +1479,8 @@
           </p:nvSpPr>
           <p:spPr>
             <a:xfrm>
-              <a:off x="-2" y="0"/>
-              <a:ext cx="10061168" cy="5296211"/>
+              <a:off x="-1" y="-1"/>
+              <a:ext cx="10061170" cy="5296214"/>
             </a:xfrm>
             <a:prstGeom prst="rect">
               <a:avLst/>
@@ -1521,8 +1523,8 @@
           </p:nvSpPr>
           <p:spPr>
             <a:xfrm>
-              <a:off x="543003" y="67669"/>
-              <a:ext cx="9450493" cy="343416"/>
+              <a:off x="543004" y="67669"/>
+              <a:ext cx="9450494" cy="264251"/>
             </a:xfrm>
             <a:prstGeom prst="rect">
               <a:avLst/>
@@ -1541,7 +1543,7 @@
           </p:spPr>
           <p:txBody>
             <a:bodyPr wrap="square" lIns="45718" tIns="45718" rIns="45718" bIns="45718" numCol="1" anchor="t">
-              <a:noAutofit/>
+              <a:spAutoFit/>
             </a:bodyPr>
             <a:lstStyle>
               <a:lvl1pPr>
@@ -1573,10 +1575,10 @@
         </p:nvGrpSpPr>
         <p:grpSpPr>
           <a:xfrm>
-            <a:off x="706500" y="341186"/>
-            <a:ext cx="10779000" cy="5800072"/>
-            <a:chOff x="-1" y="0"/>
-            <a:chExt cx="10778998" cy="5800071"/>
+            <a:off x="706498" y="270767"/>
+            <a:ext cx="10712290" cy="5870491"/>
+            <a:chOff x="0" y="0"/>
+            <a:chExt cx="10712288" cy="5870490"/>
           </a:xfrm>
         </p:grpSpPr>
         <p:sp>
@@ -1587,8 +1589,8 @@
           </p:nvSpPr>
           <p:spPr>
             <a:xfrm>
-              <a:off x="-2" y="-1"/>
-              <a:ext cx="10779000" cy="5800072"/>
+              <a:off x="0" y="0"/>
+              <a:ext cx="10548624" cy="5870491"/>
             </a:xfrm>
             <a:prstGeom prst="rect">
               <a:avLst/>
@@ -1626,17 +1628,51 @@
         <p:sp>
           <p:nvSpPr>
             <p:cNvPr id="25" name="AWS Cloud"/>
-            <p:cNvSpPr txBox="1"/>
+            <p:cNvSpPr/>
             <p:nvPr/>
           </p:nvSpPr>
           <p:spPr>
             <a:xfrm>
-              <a:off x="469848" y="58551"/>
-              <a:ext cx="10250597" cy="297150"/>
+              <a:off x="461689" y="47363"/>
+              <a:ext cx="10250600" cy="1"/>
             </a:xfrm>
-            <a:prstGeom prst="rect">
+            <a:custGeom>
               <a:avLst/>
-            </a:prstGeom>
+              <a:gdLst/>
+              <a:ahLst/>
+              <a:cxnLst>
+                <a:cxn ang="0">
+                  <a:pos x="wd2" y="hd2"/>
+                </a:cxn>
+                <a:cxn ang="5400000">
+                  <a:pos x="wd2" y="hd2"/>
+                </a:cxn>
+                <a:cxn ang="10800000">
+                  <a:pos x="wd2" y="hd2"/>
+                </a:cxn>
+                <a:cxn ang="16200000">
+                  <a:pos x="wd2" y="hd2"/>
+                </a:cxn>
+              </a:cxnLst>
+              <a:rect l="0" t="0" r="r" b="b"/>
+              <a:pathLst>
+                <a:path w="21600" h="0" fill="norm" stroke="1" extrusionOk="0">
+                  <a:moveTo>
+                    <a:pt x="0" y="0"/>
+                  </a:moveTo>
+                  <a:lnTo>
+                    <a:pt x="21600" y="0"/>
+                  </a:lnTo>
+                  <a:lnTo>
+                    <a:pt x="21600" y="0"/>
+                  </a:lnTo>
+                  <a:lnTo>
+                    <a:pt x="0" y="0"/>
+                  </a:lnTo>
+                  <a:close/>
+                </a:path>
+              </a:pathLst>
+            </a:custGeom>
             <a:noFill/>
             <a:ln w="12700" cap="flat">
               <a:noFill/>
@@ -1651,7 +1687,7 @@
           </p:spPr>
           <p:txBody>
             <a:bodyPr wrap="square" lIns="45718" tIns="45718" rIns="45718" bIns="45718" numCol="1" anchor="t">
-              <a:noAutofit/>
+              <a:spAutoFit/>
             </a:bodyPr>
             <a:lstStyle>
               <a:lvl1pPr>
@@ -1684,9 +1720,9 @@
         <p:grpSpPr>
           <a:xfrm>
             <a:off x="1238849" y="918595"/>
-            <a:ext cx="3040846" cy="4835883"/>
+            <a:ext cx="3040848" cy="4835884"/>
             <a:chOff x="0" y="0"/>
-            <a:chExt cx="3040845" cy="4835881"/>
+            <a:chExt cx="3040847" cy="4835883"/>
           </a:xfrm>
         </p:grpSpPr>
         <p:sp>
@@ -1697,8 +1733,8 @@
           </p:nvSpPr>
           <p:spPr>
             <a:xfrm>
-              <a:off x="113545" y="0"/>
-              <a:ext cx="2927301" cy="4835882"/>
+              <a:off x="113544" y="0"/>
+              <a:ext cx="2927304" cy="4835884"/>
             </a:xfrm>
             <a:prstGeom prst="rect">
               <a:avLst/>
@@ -1741,8 +1777,8 @@
           </p:nvSpPr>
           <p:spPr>
             <a:xfrm>
-              <a:off x="0" y="78835"/>
-              <a:ext cx="2817728" cy="1"/>
+              <a:off x="0" y="78834"/>
+              <a:ext cx="2817729" cy="1"/>
             </a:xfrm>
             <a:custGeom>
               <a:avLst/>
@@ -1837,8 +1873,8 @@
         </p:blipFill>
         <p:spPr>
           <a:xfrm>
-            <a:off x="706504" y="341189"/>
-            <a:ext cx="330203" cy="330203"/>
+            <a:off x="698343" y="267743"/>
+            <a:ext cx="330204" cy="330204"/>
           </a:xfrm>
           <a:prstGeom prst="rect">
             <a:avLst/>
@@ -1850,7 +1886,7 @@
       </p:pic>
       <p:pic>
         <p:nvPicPr>
-          <p:cNvPr id="31" name="Graphic 62" descr="Graphic 62"/>
+          <p:cNvPr id="31" name="Graphic 63" descr="Graphic 63"/>
           <p:cNvPicPr>
             <a:picLocks noChangeAspect="1"/>
           </p:cNvPicPr>
@@ -1865,34 +1901,9 @@
           </a:stretch>
         </p:blipFill>
         <p:spPr>
-          <a:prstGeom prst="rect">
-            <a:avLst/>
-          </a:prstGeom>
-          <a:ln w="12700">
-            <a:miter lim="400000"/>
-          </a:ln>
-        </p:spPr>
-      </p:pic>
-      <p:pic>
-        <p:nvPicPr>
-          <p:cNvPr id="32" name="Graphic 63" descr="Graphic 63"/>
-          <p:cNvPicPr>
-            <a:picLocks noChangeAspect="1"/>
-          </p:cNvPicPr>
-          <p:nvPr/>
-        </p:nvPicPr>
-        <p:blipFill>
-          <a:blip r:embed="rId4">
-            <a:extLst/>
-          </a:blip>
-          <a:stretch>
-            <a:fillRect/>
-          </a:stretch>
-        </p:blipFill>
-        <p:spPr>
           <a:xfrm>
-            <a:off x="1367666" y="941532"/>
-            <a:ext cx="274323" cy="274323"/>
+            <a:off x="1367666" y="941531"/>
+            <a:ext cx="274324" cy="274324"/>
           </a:xfrm>
           <a:prstGeom prst="rect">
             <a:avLst/>
@@ -1904,14 +1915,14 @@
       </p:pic>
       <p:sp>
         <p:nvSpPr>
-          <p:cNvPr id="33" name="TextBox 65"/>
+          <p:cNvPr id="32" name="TextBox 65"/>
           <p:cNvSpPr txBox="1"/>
           <p:nvPr/>
         </p:nvSpPr>
         <p:spPr>
           <a:xfrm>
-            <a:off x="2083210" y="2041888"/>
-            <a:ext cx="1061741" cy="264251"/>
+            <a:off x="2083210" y="2041887"/>
+            <a:ext cx="1061742" cy="264252"/>
           </a:xfrm>
           <a:prstGeom prst="rect">
             <a:avLst/>
@@ -1949,14 +1960,14 @@
       </p:sp>
       <p:pic>
         <p:nvPicPr>
-          <p:cNvPr id="34" name="Graphic 66" descr="Graphic 66"/>
+          <p:cNvPr id="33" name="Graphic 66" descr="Graphic 66"/>
           <p:cNvPicPr>
             <a:picLocks noChangeAspect="1"/>
           </p:cNvPicPr>
           <p:nvPr/>
         </p:nvPicPr>
         <p:blipFill>
-          <a:blip r:embed="rId5">
+          <a:blip r:embed="rId4">
             <a:extLst/>
           </a:blip>
           <a:stretch>
@@ -1965,8 +1976,8 @@
         </p:blipFill>
         <p:spPr>
           <a:xfrm>
-            <a:off x="2414616" y="1593320"/>
-            <a:ext cx="469904" cy="469903"/>
+            <a:off x="2414615" y="1593319"/>
+            <a:ext cx="469906" cy="469904"/>
           </a:xfrm>
           <a:prstGeom prst="rect">
             <a:avLst/>
@@ -1978,28 +1989,28 @@
       </p:pic>
       <p:grpSp>
         <p:nvGrpSpPr>
-          <p:cNvPr id="37" name="Rectangle 80"/>
+          <p:cNvPr id="36" name="Rectangle 80"/>
           <p:cNvGrpSpPr/>
           <p:nvPr/>
         </p:nvGrpSpPr>
         <p:grpSpPr>
           <a:xfrm>
-            <a:off x="7578354" y="923746"/>
-            <a:ext cx="2927302" cy="4825582"/>
-            <a:chOff x="-1" y="-1"/>
-            <a:chExt cx="2927300" cy="4825581"/>
+            <a:off x="7578352" y="923744"/>
+            <a:ext cx="2927305" cy="4825584"/>
+            <a:chOff x="0" y="-1"/>
+            <a:chExt cx="2927303" cy="4825582"/>
           </a:xfrm>
         </p:grpSpPr>
         <p:sp>
           <p:nvSpPr>
-            <p:cNvPr id="35" name="Rectangle"/>
+            <p:cNvPr id="34" name="Rectangle"/>
             <p:cNvSpPr/>
             <p:nvPr/>
           </p:nvSpPr>
           <p:spPr>
             <a:xfrm>
-              <a:off x="-2" y="-2"/>
-              <a:ext cx="2927302" cy="4825582"/>
+              <a:off x="-1" y="-2"/>
+              <a:ext cx="2927304" cy="4825584"/>
             </a:xfrm>
             <a:prstGeom prst="rect">
               <a:avLst/>
@@ -2036,14 +2047,14 @@
         </p:sp>
         <p:sp>
           <p:nvSpPr>
-            <p:cNvPr id="36" name="Availability Zone 2"/>
+            <p:cNvPr id="35" name="Availability Zone 2"/>
             <p:cNvSpPr txBox="1"/>
             <p:nvPr/>
           </p:nvSpPr>
           <p:spPr>
             <a:xfrm>
-              <a:off x="54785" y="54786"/>
-              <a:ext cx="2817727" cy="264252"/>
+              <a:off x="54786" y="54786"/>
+              <a:ext cx="2817729" cy="264252"/>
             </a:xfrm>
             <a:prstGeom prst="rect">
               <a:avLst/>
@@ -2086,41 +2097,16 @@
           </p:txBody>
         </p:sp>
       </p:grpSp>
-      <p:pic>
-        <p:nvPicPr>
-          <p:cNvPr id="38" name="Graphic 81" descr="Graphic 81"/>
-          <p:cNvPicPr>
-            <a:picLocks noChangeAspect="1"/>
-          </p:cNvPicPr>
-          <p:nvPr/>
-        </p:nvPicPr>
-        <p:blipFill>
-          <a:blip r:embed="rId4">
-            <a:extLst/>
-          </a:blip>
-          <a:stretch>
-            <a:fillRect/>
-          </a:stretch>
-        </p:blipFill>
-        <p:spPr>
-          <a:prstGeom prst="rect">
-            <a:avLst/>
-          </a:prstGeom>
-          <a:ln w="12700">
-            <a:miter lim="400000"/>
-          </a:ln>
-        </p:spPr>
-      </p:pic>
       <p:sp>
         <p:nvSpPr>
-          <p:cNvPr id="39" name="TextBox 83"/>
+          <p:cNvPr id="37" name="TextBox 83"/>
           <p:cNvSpPr txBox="1"/>
           <p:nvPr/>
         </p:nvSpPr>
         <p:spPr>
           <a:xfrm>
-            <a:off x="5395130" y="2056043"/>
-            <a:ext cx="1067788" cy="264251"/>
+            <a:off x="5395129" y="2056042"/>
+            <a:ext cx="1067790" cy="264252"/>
           </a:xfrm>
           <a:prstGeom prst="rect">
             <a:avLst/>
@@ -2158,14 +2144,14 @@
       </p:sp>
       <p:pic>
         <p:nvPicPr>
-          <p:cNvPr id="40" name="Graphic 84" descr="Graphic 84"/>
+          <p:cNvPr id="38" name="Graphic 84" descr="Graphic 84"/>
           <p:cNvPicPr>
             <a:picLocks noChangeAspect="1"/>
           </p:cNvPicPr>
           <p:nvPr/>
         </p:nvPicPr>
         <p:blipFill>
-          <a:blip r:embed="rId5">
+          <a:blip r:embed="rId4">
             <a:extLst/>
           </a:blip>
           <a:stretch>
@@ -2174,8 +2160,8 @@
         </p:blipFill>
         <p:spPr>
           <a:xfrm>
-            <a:off x="5694074" y="1593321"/>
-            <a:ext cx="469903" cy="469903"/>
+            <a:off x="5694074" y="1593320"/>
+            <a:ext cx="469904" cy="469904"/>
           </a:xfrm>
           <a:prstGeom prst="rect">
             <a:avLst/>
@@ -2187,14 +2173,14 @@
       </p:pic>
       <p:sp>
         <p:nvSpPr>
-          <p:cNvPr id="41" name="Rectangle"/>
+          <p:cNvPr id="39" name="Rectangle"/>
           <p:cNvSpPr/>
           <p:nvPr/>
         </p:nvSpPr>
         <p:spPr>
           <a:xfrm>
             <a:off x="1899354" y="2882692"/>
-            <a:ext cx="8059340" cy="1625406"/>
+            <a:ext cx="8059340" cy="1625407"/>
           </a:xfrm>
           <a:prstGeom prst="rect">
             <a:avLst/>
@@ -2230,14 +2216,14 @@
       </p:sp>
       <p:pic>
         <p:nvPicPr>
-          <p:cNvPr id="42" name="Graphic 60" descr="Graphic 60"/>
+          <p:cNvPr id="40" name="Graphic 60" descr="Graphic 60"/>
           <p:cNvPicPr>
             <a:picLocks noChangeAspect="1"/>
           </p:cNvPicPr>
           <p:nvPr/>
         </p:nvPicPr>
         <p:blipFill>
-          <a:blip r:embed="rId6">
+          <a:blip r:embed="rId5">
             <a:extLst/>
           </a:blip>
           <a:stretch>
@@ -2247,7 +2233,7 @@
         <p:spPr>
           <a:xfrm>
             <a:off x="5757886" y="2713812"/>
-            <a:ext cx="330203" cy="330203"/>
+            <a:ext cx="330204" cy="330204"/>
           </a:xfrm>
           <a:prstGeom prst="rect">
             <a:avLst/>
@@ -2259,14 +2245,14 @@
       </p:pic>
       <p:sp>
         <p:nvSpPr>
-          <p:cNvPr id="43" name="Auto Scaling group"/>
+          <p:cNvPr id="41" name="Auto Scaling group"/>
           <p:cNvSpPr txBox="1"/>
           <p:nvPr/>
         </p:nvSpPr>
         <p:spPr>
           <a:xfrm>
             <a:off x="5071443" y="2929780"/>
-            <a:ext cx="1560383" cy="442051"/>
+            <a:ext cx="1560384" cy="442051"/>
           </a:xfrm>
           <a:prstGeom prst="rect">
             <a:avLst/>
@@ -2321,14 +2307,14 @@
       </p:sp>
       <p:pic>
         <p:nvPicPr>
-          <p:cNvPr id="44" name="Res_Amazon-EC2_Instances_48_Light.png" descr="Res_Amazon-EC2_Instances_48_Light.png"/>
+          <p:cNvPr id="42" name="Res_Amazon-EC2_Instances_48_Light.png" descr="Res_Amazon-EC2_Instances_48_Light.png"/>
           <p:cNvPicPr>
             <a:picLocks noChangeAspect="1"/>
           </p:cNvPicPr>
           <p:nvPr/>
         </p:nvPicPr>
         <p:blipFill>
-          <a:blip r:embed="rId7">
+          <a:blip r:embed="rId6">
             <a:extLst/>
           </a:blip>
           <a:stretch>
@@ -2337,8 +2323,8 @@
         </p:blipFill>
         <p:spPr>
           <a:xfrm>
-            <a:off x="2309280" y="3482087"/>
-            <a:ext cx="609604" cy="609604"/>
+            <a:off x="2309279" y="3482087"/>
+            <a:ext cx="609605" cy="609605"/>
           </a:xfrm>
           <a:prstGeom prst="rect">
             <a:avLst/>
@@ -2350,14 +2336,14 @@
       </p:pic>
       <p:pic>
         <p:nvPicPr>
-          <p:cNvPr id="45" name="Res_Amazon-EC2_Instances_48_Light.png" descr="Res_Amazon-EC2_Instances_48_Light.png"/>
+          <p:cNvPr id="43" name="Res_Amazon-EC2_Instances_48_Light.png" descr="Res_Amazon-EC2_Instances_48_Light.png"/>
           <p:cNvPicPr>
             <a:picLocks noChangeAspect="1"/>
           </p:cNvPicPr>
           <p:nvPr/>
         </p:nvPicPr>
         <p:blipFill>
-          <a:blip r:embed="rId7">
+          <a:blip r:embed="rId6">
             <a:extLst/>
           </a:blip>
           <a:stretch>
@@ -2366,8 +2352,8 @@
         </p:blipFill>
         <p:spPr>
           <a:xfrm>
-            <a:off x="8737204" y="3482087"/>
-            <a:ext cx="609603" cy="609604"/>
+            <a:off x="8737203" y="3482087"/>
+            <a:ext cx="609604" cy="609605"/>
           </a:xfrm>
           <a:prstGeom prst="rect">
             <a:avLst/>
@@ -2379,13 +2365,58 @@
       </p:pic>
       <p:sp>
         <p:nvSpPr>
-          <p:cNvPr id="46" name="172.31.0.0/16"/>
+          <p:cNvPr id="44" name="172.31.0.0/16"/>
           <p:cNvSpPr txBox="1"/>
           <p:nvPr/>
         </p:nvSpPr>
         <p:spPr>
           <a:xfrm>
-            <a:off x="2131408" y="4093621"/>
+            <a:off x="2124512" y="4093622"/>
+            <a:ext cx="1121080" cy="269237"/>
+          </a:xfrm>
+          <a:prstGeom prst="rect">
+            <a:avLst/>
+          </a:prstGeom>
+          <a:ln w="12700">
+            <a:miter lim="400000"/>
+          </a:ln>
+          <a:extLst>
+            <a:ext uri="{C572A759-6A51-4108-AA02-DFA0A04FC94B}">
+              <ma14:wrappingTextBoxFlag xmlns:ma14="http://schemas.microsoft.com/office/mac/drawingml/2011/main" val="1"/>
+            </a:ext>
+          </a:extLst>
+        </p:spPr>
+        <p:txBody>
+          <a:bodyPr wrap="none" lIns="45718" tIns="45718" rIns="45718" bIns="45718">
+            <a:spAutoFit/>
+          </a:bodyPr>
+          <a:lstStyle>
+            <a:lvl1pPr>
+              <a:defRPr sz="1200">
+                <a:latin typeface="+mj-lt"/>
+                <a:ea typeface="+mj-ea"/>
+                <a:cs typeface="+mj-cs"/>
+                <a:sym typeface="Helvetica"/>
+              </a:defRPr>
+            </a:lvl1pPr>
+          </a:lstStyle>
+          <a:p>
+            <a:pPr/>
+            <a:r>
+              <a:t>172.31.16.0/20</a:t>
+            </a:r>
+          </a:p>
+        </p:txBody>
+      </p:sp>
+      <p:sp>
+        <p:nvSpPr>
+          <p:cNvPr id="45" name="172.31.0.0/16"/>
+          <p:cNvSpPr txBox="1"/>
+          <p:nvPr/>
+        </p:nvSpPr>
+        <p:spPr>
+          <a:xfrm>
+            <a:off x="5404826" y="4093620"/>
             <a:ext cx="1036322" cy="269237"/>
           </a:xfrm>
           <a:prstGeom prst="rect">
@@ -2417,80 +2448,35 @@
           <a:p>
             <a:pPr/>
             <a:r>
-              <a:t>172.31.0.0/16</a:t>
-            </a:r>
-          </a:p>
-        </p:txBody>
-      </p:sp>
-      <p:sp>
-        <p:nvSpPr>
-          <p:cNvPr id="47" name="172.31.0.0/16"/>
-          <p:cNvSpPr txBox="1"/>
-          <p:nvPr/>
-        </p:nvSpPr>
-        <p:spPr>
-          <a:xfrm>
-            <a:off x="5395130" y="4093621"/>
-            <a:ext cx="1036322" cy="269237"/>
-          </a:xfrm>
-          <a:prstGeom prst="rect">
-            <a:avLst/>
-          </a:prstGeom>
-          <a:ln w="12700">
-            <a:miter lim="400000"/>
-          </a:ln>
-          <a:extLst>
-            <a:ext uri="{C572A759-6A51-4108-AA02-DFA0A04FC94B}">
-              <ma14:wrappingTextBoxFlag xmlns:ma14="http://schemas.microsoft.com/office/mac/drawingml/2011/main" val="1"/>
-            </a:ext>
-          </a:extLst>
-        </p:spPr>
-        <p:txBody>
-          <a:bodyPr wrap="none" lIns="45718" tIns="45718" rIns="45718" bIns="45718">
-            <a:spAutoFit/>
-          </a:bodyPr>
-          <a:lstStyle>
-            <a:lvl1pPr>
-              <a:defRPr sz="1200">
-                <a:latin typeface="+mj-lt"/>
-                <a:ea typeface="+mj-ea"/>
-                <a:cs typeface="+mj-cs"/>
-                <a:sym typeface="Helvetica"/>
-              </a:defRPr>
-            </a:lvl1pPr>
-          </a:lstStyle>
-          <a:p>
-            <a:pPr/>
-            <a:r>
-              <a:t>172.31.0.0/16</a:t>
+              <a:t>172.31.0.0/20</a:t>
             </a:r>
           </a:p>
         </p:txBody>
       </p:sp>
       <p:grpSp>
         <p:nvGrpSpPr>
-          <p:cNvPr id="50" name="Rectangle 80"/>
+          <p:cNvPr id="48" name="Rectangle 80"/>
           <p:cNvGrpSpPr/>
           <p:nvPr/>
         </p:nvGrpSpPr>
         <p:grpSpPr>
           <a:xfrm>
-            <a:off x="4459336" y="923746"/>
-            <a:ext cx="2927302" cy="4825582"/>
-            <a:chOff x="-1" y="-1"/>
-            <a:chExt cx="2927300" cy="4825581"/>
+            <a:off x="4459335" y="923744"/>
+            <a:ext cx="2927304" cy="4825584"/>
+            <a:chOff x="0" y="-1"/>
+            <a:chExt cx="2927303" cy="4825582"/>
           </a:xfrm>
         </p:grpSpPr>
         <p:sp>
           <p:nvSpPr>
-            <p:cNvPr id="48" name="Rectangle"/>
+            <p:cNvPr id="46" name="Rectangle"/>
             <p:cNvSpPr/>
             <p:nvPr/>
           </p:nvSpPr>
           <p:spPr>
             <a:xfrm>
-              <a:off x="-2" y="-2"/>
-              <a:ext cx="2927302" cy="4825582"/>
+              <a:off x="-1" y="-2"/>
+              <a:ext cx="2927304" cy="4825584"/>
             </a:xfrm>
             <a:prstGeom prst="rect">
               <a:avLst/>
@@ -2527,14 +2513,14 @@
         </p:sp>
         <p:sp>
           <p:nvSpPr>
-            <p:cNvPr id="49" name="Availability Zone 2"/>
+            <p:cNvPr id="47" name="Availability Zone 2"/>
             <p:cNvSpPr txBox="1"/>
             <p:nvPr/>
           </p:nvSpPr>
           <p:spPr>
             <a:xfrm>
-              <a:off x="54785" y="54786"/>
-              <a:ext cx="2817727" cy="264252"/>
+              <a:off x="54786" y="54786"/>
+              <a:ext cx="2817729" cy="264252"/>
             </a:xfrm>
             <a:prstGeom prst="rect">
               <a:avLst/>
@@ -2579,28 +2565,28 @@
       </p:grpSp>
       <p:grpSp>
         <p:nvGrpSpPr>
-          <p:cNvPr id="54" name="Rectangle 55"/>
+          <p:cNvPr id="52" name="Rectangle 55"/>
           <p:cNvGrpSpPr/>
           <p:nvPr/>
         </p:nvGrpSpPr>
         <p:grpSpPr>
           <a:xfrm>
-            <a:off x="1442110" y="1290703"/>
-            <a:ext cx="8961754" cy="4471228"/>
+            <a:off x="1442110" y="1273627"/>
+            <a:ext cx="8961755" cy="4471230"/>
             <a:chOff x="0" y="0"/>
-            <a:chExt cx="8961752" cy="4471227"/>
+            <a:chExt cx="8961754" cy="4471229"/>
           </a:xfrm>
         </p:grpSpPr>
         <p:sp>
           <p:nvSpPr>
-            <p:cNvPr id="51" name="Rectangle"/>
+            <p:cNvPr id="49" name="Rectangle"/>
             <p:cNvSpPr/>
             <p:nvPr/>
           </p:nvSpPr>
           <p:spPr>
             <a:xfrm>
-              <a:off x="0" y="0"/>
-              <a:ext cx="2649890" cy="4471228"/>
+              <a:off x="-1" y="-1"/>
+              <a:ext cx="2649891" cy="4471230"/>
             </a:xfrm>
             <a:prstGeom prst="rect">
               <a:avLst/>
@@ -2638,14 +2624,14 @@
         </p:sp>
         <p:sp>
           <p:nvSpPr>
-            <p:cNvPr id="52" name="Rectangle"/>
+            <p:cNvPr id="50" name="Rectangle"/>
             <p:cNvSpPr/>
             <p:nvPr/>
           </p:nvSpPr>
           <p:spPr>
             <a:xfrm>
-              <a:off x="3112795" y="0"/>
-              <a:ext cx="2649891" cy="4471228"/>
+              <a:off x="3112795" y="-1"/>
+              <a:ext cx="2649892" cy="4471230"/>
             </a:xfrm>
             <a:prstGeom prst="rect">
               <a:avLst/>
@@ -2683,14 +2669,14 @@
         </p:sp>
         <p:sp>
           <p:nvSpPr>
-            <p:cNvPr id="53" name="Rectangle"/>
+            <p:cNvPr id="51" name="Rectangle"/>
             <p:cNvSpPr/>
             <p:nvPr/>
           </p:nvSpPr>
           <p:spPr>
             <a:xfrm>
-              <a:off x="6311862" y="0"/>
-              <a:ext cx="2649891" cy="4471228"/>
+              <a:off x="6311863" y="-1"/>
+              <a:ext cx="2649892" cy="4471230"/>
             </a:xfrm>
             <a:prstGeom prst="rect">
               <a:avLst/>
@@ -2729,14 +2715,14 @@
       </p:grpSp>
       <p:pic>
         <p:nvPicPr>
-          <p:cNvPr id="55" name="Graphic 63" descr="Graphic 63"/>
+          <p:cNvPr id="53" name="Graphic 63" descr="Graphic 63"/>
           <p:cNvPicPr>
             <a:picLocks noChangeAspect="1"/>
           </p:cNvPicPr>
           <p:nvPr/>
         </p:nvPicPr>
         <p:blipFill>
-          <a:blip r:embed="rId4">
+          <a:blip r:embed="rId3">
             <a:extLst/>
           </a:blip>
           <a:stretch>
@@ -2745,8 +2731,8 @@
         </p:blipFill>
         <p:spPr>
           <a:xfrm>
-            <a:off x="4473009" y="941532"/>
-            <a:ext cx="274323" cy="274323"/>
+            <a:off x="4473009" y="941531"/>
+            <a:ext cx="274324" cy="274324"/>
           </a:xfrm>
           <a:prstGeom prst="rect">
             <a:avLst/>
@@ -2758,14 +2744,14 @@
       </p:pic>
       <p:pic>
         <p:nvPicPr>
-          <p:cNvPr id="56" name="Graphic 63" descr="Graphic 63"/>
+          <p:cNvPr id="54" name="Graphic 63" descr="Graphic 63"/>
           <p:cNvPicPr>
             <a:picLocks noChangeAspect="1"/>
           </p:cNvPicPr>
           <p:nvPr/>
         </p:nvPicPr>
         <p:blipFill>
-          <a:blip r:embed="rId4">
+          <a:blip r:embed="rId3">
             <a:extLst/>
           </a:blip>
           <a:stretch>
@@ -2774,8 +2760,8 @@
         </p:blipFill>
         <p:spPr>
           <a:xfrm>
-            <a:off x="7578353" y="941532"/>
-            <a:ext cx="274323" cy="274323"/>
+            <a:off x="7578352" y="941531"/>
+            <a:ext cx="274324" cy="274324"/>
           </a:xfrm>
           <a:prstGeom prst="rect">
             <a:avLst/>
@@ -2787,14 +2773,14 @@
       </p:pic>
       <p:sp>
         <p:nvSpPr>
-          <p:cNvPr id="57" name="Rectangle 55"/>
+          <p:cNvPr id="55" name="Rectangle 55"/>
           <p:cNvSpPr txBox="1"/>
           <p:nvPr/>
         </p:nvSpPr>
         <p:spPr>
           <a:xfrm>
-            <a:off x="5395130" y="1212682"/>
-            <a:ext cx="2487329" cy="287317"/>
+            <a:off x="5395129" y="1212681"/>
+            <a:ext cx="2487330" cy="264252"/>
           </a:xfrm>
           <a:prstGeom prst="rect">
             <a:avLst/>
@@ -2809,7 +2795,9 @@
           </a:extLst>
         </p:spPr>
         <p:txBody>
-          <a:bodyPr lIns="45718" tIns="45718" rIns="45718" bIns="45718"/>
+          <a:bodyPr lIns="45718" tIns="45718" rIns="45718" bIns="45718">
+            <a:spAutoFit/>
+          </a:bodyPr>
           <a:lstStyle>
             <a:lvl1pPr>
               <a:defRPr sz="1200">
@@ -2833,14 +2821,14 @@
       </p:sp>
       <p:sp>
         <p:nvSpPr>
-          <p:cNvPr id="58" name="Rectangle 55"/>
+          <p:cNvPr id="56" name="Rectangle 55"/>
           <p:cNvSpPr txBox="1"/>
           <p:nvPr/>
         </p:nvSpPr>
         <p:spPr>
           <a:xfrm>
-            <a:off x="8600383" y="1212682"/>
-            <a:ext cx="2487329" cy="287317"/>
+            <a:off x="8600382" y="1212681"/>
+            <a:ext cx="2487330" cy="264252"/>
           </a:xfrm>
           <a:prstGeom prst="rect">
             <a:avLst/>
@@ -2855,7 +2843,9 @@
           </a:extLst>
         </p:spPr>
         <p:txBody>
-          <a:bodyPr lIns="45718" tIns="45718" rIns="45718" bIns="45718"/>
+          <a:bodyPr lIns="45718" tIns="45718" rIns="45718" bIns="45718">
+            <a:spAutoFit/>
+          </a:bodyPr>
           <a:lstStyle>
             <a:lvl1pPr>
               <a:defRPr sz="1200">
@@ -2879,14 +2869,14 @@
       </p:sp>
       <p:pic>
         <p:nvPicPr>
-          <p:cNvPr id="59" name="Graphic 84" descr="Graphic 84"/>
+          <p:cNvPr id="57" name="Graphic 84" descr="Graphic 84"/>
           <p:cNvPicPr>
             <a:picLocks noChangeAspect="1"/>
           </p:cNvPicPr>
           <p:nvPr/>
         </p:nvPicPr>
         <p:blipFill>
-          <a:blip r:embed="rId5">
+          <a:blip r:embed="rId4">
             <a:extLst/>
           </a:blip>
           <a:stretch>
@@ -2895,8 +2885,8 @@
         </p:blipFill>
         <p:spPr>
           <a:xfrm>
-            <a:off x="8807054" y="1593321"/>
-            <a:ext cx="469903" cy="469903"/>
+            <a:off x="8807053" y="1593320"/>
+            <a:ext cx="469904" cy="469904"/>
           </a:xfrm>
           <a:prstGeom prst="rect">
             <a:avLst/>
@@ -2908,14 +2898,14 @@
       </p:pic>
       <p:sp>
         <p:nvSpPr>
-          <p:cNvPr id="60" name="TextBox 83"/>
+          <p:cNvPr id="58" name="TextBox 83"/>
           <p:cNvSpPr txBox="1"/>
           <p:nvPr/>
         </p:nvSpPr>
         <p:spPr>
           <a:xfrm>
-            <a:off x="8508110" y="2056043"/>
-            <a:ext cx="1067788" cy="264251"/>
+            <a:off x="8508110" y="2056042"/>
+            <a:ext cx="1067789" cy="264252"/>
           </a:xfrm>
           <a:prstGeom prst="rect">
             <a:avLst/>
@@ -2953,14 +2943,14 @@
       </p:sp>
       <p:pic>
         <p:nvPicPr>
-          <p:cNvPr id="61" name="Res_Amazon-EC2_Instances_48_Light.png" descr="Res_Amazon-EC2_Instances_48_Light.png"/>
+          <p:cNvPr id="59" name="Res_Amazon-EC2_Instances_48_Light.png" descr="Res_Amazon-EC2_Instances_48_Light.png"/>
           <p:cNvPicPr>
             <a:picLocks noChangeAspect="1"/>
           </p:cNvPicPr>
           <p:nvPr/>
         </p:nvPicPr>
         <p:blipFill>
-          <a:blip r:embed="rId7">
+          <a:blip r:embed="rId6">
             <a:extLst/>
           </a:blip>
           <a:stretch>
@@ -2970,7 +2960,7 @@
         <p:spPr>
           <a:xfrm>
             <a:off x="5694074" y="3482087"/>
-            <a:ext cx="609603" cy="609604"/>
+            <a:ext cx="609604" cy="609605"/>
           </a:xfrm>
           <a:prstGeom prst="rect">
             <a:avLst/>
@@ -2982,14 +2972,14 @@
       </p:pic>
       <p:sp>
         <p:nvSpPr>
-          <p:cNvPr id="62" name="172.31.0.0/16"/>
+          <p:cNvPr id="60" name="172.31.0.0/16"/>
           <p:cNvSpPr txBox="1"/>
           <p:nvPr/>
         </p:nvSpPr>
         <p:spPr>
           <a:xfrm>
-            <a:off x="8523842" y="4093621"/>
-            <a:ext cx="1036322" cy="269237"/>
+            <a:off x="8523841" y="4093621"/>
+            <a:ext cx="1121080" cy="269237"/>
           </a:xfrm>
           <a:prstGeom prst="rect">
             <a:avLst/>
@@ -3020,7 +3010,7 @@
           <a:p>
             <a:pPr/>
             <a:r>
-              <a:t>172.31.0.0/16</a:t>
+              <a:t>172.31.32.0/20</a:t>
             </a:r>
           </a:p>
         </p:txBody>

</xml_diff>